<commit_message>
Updated readme, ppt, requirements, and rankers
</commit_message>
<xml_diff>
--- a/docs/Text Similarity.pptx
+++ b/docs/Text Similarity.pptx
@@ -5,17 +5,20 @@
     <p:sldMasterId id="2147483660" r:id="rId4"/>
   </p:sldMasterIdLst>
   <p:notesMasterIdLst>
-    <p:notesMasterId r:id="rId13"/>
+    <p:notesMasterId r:id="rId16"/>
   </p:notesMasterIdLst>
   <p:sldIdLst>
     <p:sldId id="264" r:id="rId5"/>
     <p:sldId id="313" r:id="rId6"/>
     <p:sldId id="314" r:id="rId7"/>
-    <p:sldId id="318" r:id="rId8"/>
-    <p:sldId id="315" r:id="rId9"/>
-    <p:sldId id="319" r:id="rId10"/>
-    <p:sldId id="316" r:id="rId11"/>
-    <p:sldId id="317" r:id="rId12"/>
+    <p:sldId id="320" r:id="rId8"/>
+    <p:sldId id="318" r:id="rId9"/>
+    <p:sldId id="315" r:id="rId10"/>
+    <p:sldId id="321" r:id="rId11"/>
+    <p:sldId id="322" r:id="rId12"/>
+    <p:sldId id="319" r:id="rId13"/>
+    <p:sldId id="316" r:id="rId14"/>
+    <p:sldId id="317" r:id="rId15"/>
   </p:sldIdLst>
   <p:sldSz cx="12192000" cy="6858000"/>
   <p:notesSz cx="6858000" cy="9144000"/>
@@ -4970,6 +4973,424 @@
 </p:sld>
 </file>
 
+<file path=ppt/slides/slide10.xml><?xml version="1.0" encoding="utf-8"?>
+<p:sld xmlns:a="http://schemas.openxmlformats.org/drawingml/2006/main" xmlns:r="http://schemas.openxmlformats.org/officeDocument/2006/relationships" xmlns:p="http://schemas.openxmlformats.org/presentationml/2006/main">
+  <p:cSld>
+    <p:spTree>
+      <p:nvGrpSpPr>
+        <p:cNvPr id="1" name=""/>
+        <p:cNvGrpSpPr/>
+        <p:nvPr/>
+      </p:nvGrpSpPr>
+      <p:grpSpPr>
+        <a:xfrm>
+          <a:off x="0" y="0"/>
+          <a:ext cx="0" cy="0"/>
+          <a:chOff x="0" y="0"/>
+          <a:chExt cx="0" cy="0"/>
+        </a:xfrm>
+      </p:grpSpPr>
+      <p:sp>
+        <p:nvSpPr>
+          <p:cNvPr id="2" name="Title 1">
+            <a:extLst>
+              <a:ext uri="{FF2B5EF4-FFF2-40B4-BE49-F238E27FC236}">
+                <a16:creationId xmlns:a16="http://schemas.microsoft.com/office/drawing/2014/main" id="{B8B1CC71-056D-4411-A7DB-3491E90D4B4F}"/>
+              </a:ext>
+            </a:extLst>
+          </p:cNvPr>
+          <p:cNvSpPr>
+            <a:spLocks noGrp="1"/>
+          </p:cNvSpPr>
+          <p:nvPr>
+            <p:ph type="title"/>
+          </p:nvPr>
+        </p:nvSpPr>
+        <p:spPr/>
+        <p:txBody>
+          <a:bodyPr/>
+          <a:lstStyle/>
+          <a:p>
+            <a:r>
+              <a:rPr lang="en-US" dirty="0"/>
+              <a:t>Lessons Learned</a:t>
+            </a:r>
+          </a:p>
+        </p:txBody>
+      </p:sp>
+      <p:sp>
+        <p:nvSpPr>
+          <p:cNvPr id="3" name="Content Placeholder 2">
+            <a:extLst>
+              <a:ext uri="{FF2B5EF4-FFF2-40B4-BE49-F238E27FC236}">
+                <a16:creationId xmlns:a16="http://schemas.microsoft.com/office/drawing/2014/main" id="{3FA8D2B1-A747-498B-814E-683AA5AE5591}"/>
+              </a:ext>
+            </a:extLst>
+          </p:cNvPr>
+          <p:cNvSpPr>
+            <a:spLocks noGrp="1"/>
+          </p:cNvSpPr>
+          <p:nvPr>
+            <p:ph idx="1"/>
+          </p:nvPr>
+        </p:nvSpPr>
+        <p:spPr>
+          <a:xfrm>
+            <a:off x="1066800" y="1766656"/>
+            <a:ext cx="10740500" cy="4678532"/>
+          </a:xfrm>
+        </p:spPr>
+        <p:txBody>
+          <a:bodyPr>
+            <a:normAutofit/>
+          </a:bodyPr>
+          <a:lstStyle/>
+          <a:p>
+            <a:r>
+              <a:rPr lang="en-US" sz="2000" dirty="0"/>
+              <a:t>Tools</a:t>
+            </a:r>
+          </a:p>
+          <a:p>
+            <a:pPr lvl="1"/>
+            <a:r>
+              <a:rPr lang="en-US" sz="1800" dirty="0"/>
+              <a:t>Travis-CI</a:t>
+            </a:r>
+          </a:p>
+          <a:p>
+            <a:pPr lvl="2"/>
+            <a:r>
+              <a:rPr lang="en-US" sz="1800" dirty="0"/>
+              <a:t>Run all tests &amp; generate coverage report</a:t>
+            </a:r>
+          </a:p>
+          <a:p>
+            <a:pPr lvl="1"/>
+            <a:r>
+              <a:rPr lang="en-US" sz="1800" dirty="0" err="1"/>
+              <a:t>Unittest</a:t>
+            </a:r>
+            <a:endParaRPr lang="en-US" sz="1800" dirty="0"/>
+          </a:p>
+          <a:p>
+            <a:pPr lvl="2"/>
+            <a:r>
+              <a:rPr lang="en-US" sz="1800" dirty="0"/>
+              <a:t>Set up / tear down methods </a:t>
+            </a:r>
+          </a:p>
+          <a:p>
+            <a:r>
+              <a:rPr lang="en-US" sz="2000" dirty="0"/>
+              <a:t>Design</a:t>
+            </a:r>
+          </a:p>
+          <a:p>
+            <a:pPr lvl="1"/>
+            <a:r>
+              <a:rPr lang="en-US" sz="1800" dirty="0"/>
+              <a:t>Verb or action prefix on methods for clarity: “calculate”, “get”, “tokenize”, “rank”</a:t>
+            </a:r>
+          </a:p>
+          <a:p>
+            <a:pPr lvl="2"/>
+            <a:r>
+              <a:rPr lang="en-US" sz="1800" dirty="0"/>
+              <a:t>Easier to understand, clearer expectations </a:t>
+            </a:r>
+          </a:p>
+          <a:p>
+            <a:pPr lvl="1"/>
+            <a:r>
+              <a:rPr lang="en-US" sz="1800" dirty="0"/>
+              <a:t>Separating functionality: modules, classes, methods</a:t>
+            </a:r>
+          </a:p>
+          <a:p>
+            <a:pPr lvl="2"/>
+            <a:r>
+              <a:rPr lang="en-US" sz="1800" dirty="0"/>
+              <a:t>Easily extendable and modifiable </a:t>
+            </a:r>
+          </a:p>
+          <a:p>
+            <a:pPr lvl="1"/>
+            <a:r>
+              <a:rPr lang="en-US" sz="1800" dirty="0"/>
+              <a:t>Abstraction, information hiding</a:t>
+            </a:r>
+          </a:p>
+          <a:p>
+            <a:pPr lvl="2"/>
+            <a:r>
+              <a:rPr lang="en-US" sz="1800" dirty="0"/>
+              <a:t>Easier to use</a:t>
+            </a:r>
+          </a:p>
+        </p:txBody>
+      </p:sp>
+      <p:pic>
+        <p:nvPicPr>
+          <p:cNvPr id="1028" name="Picture 4" descr="See the source image">
+            <a:extLst>
+              <a:ext uri="{FF2B5EF4-FFF2-40B4-BE49-F238E27FC236}">
+                <a16:creationId xmlns:a16="http://schemas.microsoft.com/office/drawing/2014/main" id="{6C721652-B7A2-4EB4-B098-B758FA70A3C3}"/>
+              </a:ext>
+            </a:extLst>
+          </p:cNvPr>
+          <p:cNvPicPr>
+            <a:picLocks noChangeAspect="1" noChangeArrowheads="1"/>
+          </p:cNvPicPr>
+          <p:nvPr/>
+        </p:nvPicPr>
+        <p:blipFill>
+          <a:blip r:embed="rId2">
+            <a:extLst>
+              <a:ext uri="{28A0092B-C50C-407E-A947-70E740481C1C}">
+                <a14:useLocalDpi xmlns:a14="http://schemas.microsoft.com/office/drawing/2010/main" val="0"/>
+              </a:ext>
+            </a:extLst>
+          </a:blip>
+          <a:srcRect/>
+          <a:stretch>
+            <a:fillRect/>
+          </a:stretch>
+        </p:blipFill>
+        <p:spPr bwMode="auto">
+          <a:xfrm>
+            <a:off x="6811212" y="771657"/>
+            <a:ext cx="4658738" cy="2720063"/>
+          </a:xfrm>
+          <a:prstGeom prst="rect">
+            <a:avLst/>
+          </a:prstGeom>
+          <a:noFill/>
+          <a:effectLst>
+            <a:softEdge rad="31750"/>
+          </a:effectLst>
+          <a:extLst>
+            <a:ext uri="{909E8E84-426E-40DD-AFC4-6F175D3DCCD1}">
+              <a14:hiddenFill xmlns:a14="http://schemas.microsoft.com/office/drawing/2010/main">
+                <a:solidFill>
+                  <a:srgbClr val="FFFFFF"/>
+                </a:solidFill>
+              </a14:hiddenFill>
+            </a:ext>
+          </a:extLst>
+        </p:spPr>
+      </p:pic>
+    </p:spTree>
+    <p:extLst>
+      <p:ext uri="{BB962C8B-B14F-4D97-AF65-F5344CB8AC3E}">
+        <p14:creationId xmlns:p14="http://schemas.microsoft.com/office/powerpoint/2010/main" val="94631367"/>
+      </p:ext>
+    </p:extLst>
+  </p:cSld>
+  <p:clrMapOvr>
+    <a:masterClrMapping/>
+  </p:clrMapOvr>
+</p:sld>
+</file>
+
+<file path=ppt/slides/slide11.xml><?xml version="1.0" encoding="utf-8"?>
+<p:sld xmlns:a="http://schemas.openxmlformats.org/drawingml/2006/main" xmlns:r="http://schemas.openxmlformats.org/officeDocument/2006/relationships" xmlns:p="http://schemas.openxmlformats.org/presentationml/2006/main">
+  <p:cSld>
+    <p:spTree>
+      <p:nvGrpSpPr>
+        <p:cNvPr id="1" name=""/>
+        <p:cNvGrpSpPr/>
+        <p:nvPr/>
+      </p:nvGrpSpPr>
+      <p:grpSpPr>
+        <a:xfrm>
+          <a:off x="0" y="0"/>
+          <a:ext cx="0" cy="0"/>
+          <a:chOff x="0" y="0"/>
+          <a:chExt cx="0" cy="0"/>
+        </a:xfrm>
+      </p:grpSpPr>
+      <p:sp>
+        <p:nvSpPr>
+          <p:cNvPr id="2" name="Title 1">
+            <a:extLst>
+              <a:ext uri="{FF2B5EF4-FFF2-40B4-BE49-F238E27FC236}">
+                <a16:creationId xmlns:a16="http://schemas.microsoft.com/office/drawing/2014/main" id="{DEBCB79F-46A5-4A6E-8DE9-E7C430C4664F}"/>
+              </a:ext>
+            </a:extLst>
+          </p:cNvPr>
+          <p:cNvSpPr>
+            <a:spLocks noGrp="1"/>
+          </p:cNvSpPr>
+          <p:nvPr>
+            <p:ph type="title"/>
+          </p:nvPr>
+        </p:nvSpPr>
+        <p:spPr/>
+        <p:txBody>
+          <a:bodyPr/>
+          <a:lstStyle/>
+          <a:p>
+            <a:r>
+              <a:rPr lang="en-US" dirty="0"/>
+              <a:t>Future Work</a:t>
+            </a:r>
+          </a:p>
+        </p:txBody>
+      </p:sp>
+      <p:sp>
+        <p:nvSpPr>
+          <p:cNvPr id="3" name="Content Placeholder 2">
+            <a:extLst>
+              <a:ext uri="{FF2B5EF4-FFF2-40B4-BE49-F238E27FC236}">
+                <a16:creationId xmlns:a16="http://schemas.microsoft.com/office/drawing/2014/main" id="{3BEA30E2-793E-4813-A476-4780B5AB739C}"/>
+              </a:ext>
+            </a:extLst>
+          </p:cNvPr>
+          <p:cNvSpPr>
+            <a:spLocks noGrp="1"/>
+          </p:cNvSpPr>
+          <p:nvPr>
+            <p:ph idx="1"/>
+          </p:nvPr>
+        </p:nvSpPr>
+        <p:spPr>
+          <a:xfrm>
+            <a:off x="1066800" y="1779321"/>
+            <a:ext cx="10058400" cy="4745765"/>
+          </a:xfrm>
+        </p:spPr>
+        <p:txBody>
+          <a:bodyPr>
+            <a:noAutofit/>
+          </a:bodyPr>
+          <a:lstStyle/>
+          <a:p>
+            <a:pPr marL="0" indent="0">
+              <a:buNone/>
+            </a:pPr>
+            <a:r>
+              <a:rPr lang="en-US" sz="1800" dirty="0"/>
+              <a:t>In the package:</a:t>
+            </a:r>
+          </a:p>
+          <a:p>
+            <a:r>
+              <a:rPr lang="en-US" sz="1800" dirty="0"/>
+              <a:t>Cross-modality expansion such as with text to image similarity </a:t>
+            </a:r>
+          </a:p>
+          <a:p>
+            <a:pPr marL="0" indent="0">
+              <a:buNone/>
+            </a:pPr>
+            <a:endParaRPr lang="en-US" sz="1800" dirty="0"/>
+          </a:p>
+          <a:p>
+            <a:pPr marL="0" indent="0">
+              <a:buNone/>
+            </a:pPr>
+            <a:r>
+              <a:rPr lang="en-US" sz="1800" dirty="0"/>
+              <a:t>In the clean text module and text models module:</a:t>
+            </a:r>
+          </a:p>
+          <a:p>
+            <a:r>
+              <a:rPr lang="en-US" sz="1800" dirty="0"/>
+              <a:t>Add support for other languages besides English</a:t>
+            </a:r>
+          </a:p>
+          <a:p>
+            <a:pPr marL="0" indent="0">
+              <a:buNone/>
+            </a:pPr>
+            <a:endParaRPr lang="en-US" sz="1800" dirty="0"/>
+          </a:p>
+          <a:p>
+            <a:pPr marL="0" indent="0">
+              <a:buNone/>
+            </a:pPr>
+            <a:r>
+              <a:rPr lang="en-US" sz="1800" dirty="0"/>
+              <a:t>In text models module:</a:t>
+            </a:r>
+          </a:p>
+          <a:p>
+            <a:r>
+              <a:rPr lang="en-US" sz="1800" dirty="0"/>
+              <a:t>Add more natural language models </a:t>
+            </a:r>
+          </a:p>
+          <a:p>
+            <a:endParaRPr lang="en-US" sz="1800" dirty="0"/>
+          </a:p>
+          <a:p>
+            <a:pPr marL="0" indent="0">
+              <a:buNone/>
+            </a:pPr>
+            <a:r>
+              <a:rPr lang="en-US" sz="1800" dirty="0"/>
+              <a:t>In the rankers module:</a:t>
+            </a:r>
+          </a:p>
+          <a:p>
+            <a:r>
+              <a:rPr lang="en-US" sz="1800" dirty="0"/>
+              <a:t>Add other rankers</a:t>
+            </a:r>
+          </a:p>
+          <a:p>
+            <a:endParaRPr lang="en-US" sz="1800" dirty="0"/>
+          </a:p>
+        </p:txBody>
+      </p:sp>
+      <p:pic>
+        <p:nvPicPr>
+          <p:cNvPr id="7" name="Picture 6">
+            <a:extLst>
+              <a:ext uri="{FF2B5EF4-FFF2-40B4-BE49-F238E27FC236}">
+                <a16:creationId xmlns:a16="http://schemas.microsoft.com/office/drawing/2014/main" id="{154FB762-FFA2-4B54-8318-1106D127E3C6}"/>
+              </a:ext>
+            </a:extLst>
+          </p:cNvPr>
+          <p:cNvPicPr>
+            <a:picLocks noChangeAspect="1"/>
+          </p:cNvPicPr>
+          <p:nvPr/>
+        </p:nvPicPr>
+        <p:blipFill>
+          <a:blip r:embed="rId2"/>
+          <a:stretch>
+            <a:fillRect/>
+          </a:stretch>
+        </p:blipFill>
+        <p:spPr>
+          <a:xfrm>
+            <a:off x="5663952" y="3839577"/>
+            <a:ext cx="6167503" cy="2521689"/>
+          </a:xfrm>
+          <a:prstGeom prst="rect">
+            <a:avLst/>
+          </a:prstGeom>
+          <a:effectLst>
+            <a:softEdge rad="317500"/>
+          </a:effectLst>
+        </p:spPr>
+      </p:pic>
+    </p:spTree>
+    <p:extLst>
+      <p:ext uri="{BB962C8B-B14F-4D97-AF65-F5344CB8AC3E}">
+        <p14:creationId xmlns:p14="http://schemas.microsoft.com/office/powerpoint/2010/main" val="1160545909"/>
+      </p:ext>
+    </p:extLst>
+  </p:cSld>
+  <p:clrMapOvr>
+    <a:masterClrMapping/>
+  </p:clrMapOvr>
+</p:sld>
+</file>
+
 <file path=ppt/slides/slide2.xml><?xml version="1.0" encoding="utf-8"?>
 <p:sld xmlns:a="http://schemas.openxmlformats.org/drawingml/2006/main" xmlns:r="http://schemas.openxmlformats.org/officeDocument/2006/relationships" xmlns:p="http://schemas.openxmlformats.org/presentationml/2006/main">
   <p:cSld>
@@ -5031,14 +5452,19 @@
             <p:ph idx="1"/>
           </p:nvPr>
         </p:nvSpPr>
-        <p:spPr/>
+        <p:spPr>
+          <a:xfrm>
+            <a:off x="1066800" y="2103120"/>
+            <a:ext cx="5060272" cy="3849624"/>
+          </a:xfrm>
+        </p:spPr>
         <p:txBody>
           <a:bodyPr/>
           <a:lstStyle/>
           <a:p>
             <a:r>
               <a:rPr lang="en-US" dirty="0"/>
-              <a:t>Text similarity</a:t>
+              <a:t>Text similarity ranking</a:t>
             </a:r>
           </a:p>
           <a:p>
@@ -5052,10 +5478,51 @@
             <a:pPr lvl="1"/>
             <a:r>
               <a:rPr lang="en-US" dirty="0"/>
-              <a:t>Phrases </a:t>
-            </a:r>
-          </a:p>
-          <a:p>
+              <a:t>Short Phrases </a:t>
+            </a:r>
+          </a:p>
+          <a:p>
+            <a:pPr marL="274320" lvl="1" indent="0">
+              <a:buNone/>
+            </a:pPr>
+            <a:endParaRPr lang="en-US" dirty="0"/>
+          </a:p>
+          <a:p>
+            <a:r>
+              <a:rPr lang="en-US" dirty="0"/>
+              <a:t>Large natural language models with contextual, semantic word embeddings allow for text comparison</a:t>
+            </a:r>
+          </a:p>
+          <a:p>
+            <a:pPr marL="0" indent="0">
+              <a:buNone/>
+            </a:pPr>
+            <a:endParaRPr lang="en-US" dirty="0"/>
+          </a:p>
+          <a:p>
+            <a:r>
+              <a:rPr lang="en-US" dirty="0"/>
+              <a:t>Text pre-processing</a:t>
+            </a:r>
+          </a:p>
+          <a:p>
+            <a:pPr lvl="1"/>
+            <a:r>
+              <a:rPr lang="en-US" dirty="0"/>
+              <a:t>Spelling</a:t>
+            </a:r>
+          </a:p>
+          <a:p>
+            <a:pPr lvl="1"/>
+            <a:r>
+              <a:rPr lang="en-US" dirty="0"/>
+              <a:t>Profanity </a:t>
+            </a:r>
+          </a:p>
+          <a:p>
+            <a:pPr marL="0" indent="0">
+              <a:buNone/>
+            </a:pPr>
             <a:r>
               <a:rPr lang="en-US" dirty="0"/>
               <a:t> </a:t>
@@ -5084,7 +5551,7 @@
         </p:blipFill>
         <p:spPr>
           <a:xfrm>
-            <a:off x="6267635" y="422337"/>
+            <a:off x="6489576" y="1523169"/>
             <a:ext cx="5060272" cy="4095750"/>
           </a:xfrm>
           <a:prstGeom prst="rect">
@@ -5166,11 +5633,246 @@
             <p:ph idx="1"/>
           </p:nvPr>
         </p:nvSpPr>
-        <p:spPr/>
-        <p:txBody>
-          <a:bodyPr/>
+        <p:spPr>
+          <a:xfrm>
+            <a:off x="1066798" y="2743200"/>
+            <a:ext cx="2652944" cy="1371600"/>
+          </a:xfrm>
+        </p:spPr>
+        <p:txBody>
+          <a:bodyPr>
+            <a:normAutofit/>
+          </a:bodyPr>
           <a:lstStyle/>
           <a:p>
+            <a:pPr marL="0" indent="0">
+              <a:buNone/>
+            </a:pPr>
+            <a:r>
+              <a:rPr lang="en-US" sz="1800" dirty="0"/>
+              <a:t>Given a query</a:t>
+            </a:r>
+          </a:p>
+          <a:p>
+            <a:r>
+              <a:rPr lang="en-US" sz="1800" dirty="0"/>
+              <a:t>Get related key words and phrases</a:t>
+            </a:r>
+          </a:p>
+        </p:txBody>
+      </p:sp>
+      <p:pic>
+        <p:nvPicPr>
+          <p:cNvPr id="5" name="Picture 4">
+            <a:extLst>
+              <a:ext uri="{FF2B5EF4-FFF2-40B4-BE49-F238E27FC236}">
+                <a16:creationId xmlns:a16="http://schemas.microsoft.com/office/drawing/2014/main" id="{8268706E-9447-4250-9646-665B3CE63332}"/>
+              </a:ext>
+            </a:extLst>
+          </p:cNvPr>
+          <p:cNvPicPr>
+            <a:picLocks noChangeAspect="1"/>
+          </p:cNvPicPr>
+          <p:nvPr/>
+        </p:nvPicPr>
+        <p:blipFill>
+          <a:blip r:embed="rId2"/>
+          <a:stretch>
+            <a:fillRect/>
+          </a:stretch>
+        </p:blipFill>
+        <p:spPr>
+          <a:xfrm>
+            <a:off x="3798720" y="0"/>
+            <a:ext cx="4594559" cy="6858000"/>
+          </a:xfrm>
+          <a:prstGeom prst="rect">
+            <a:avLst/>
+          </a:prstGeom>
+        </p:spPr>
+      </p:pic>
+      <p:pic>
+        <p:nvPicPr>
+          <p:cNvPr id="7" name="Picture 6">
+            <a:extLst>
+              <a:ext uri="{FF2B5EF4-FFF2-40B4-BE49-F238E27FC236}">
+                <a16:creationId xmlns:a16="http://schemas.microsoft.com/office/drawing/2014/main" id="{2F9A849F-2862-4B15-8160-2BC5EC181650}"/>
+              </a:ext>
+            </a:extLst>
+          </p:cNvPr>
+          <p:cNvPicPr>
+            <a:picLocks noChangeAspect="1"/>
+          </p:cNvPicPr>
+          <p:nvPr/>
+        </p:nvPicPr>
+        <p:blipFill>
+          <a:blip r:embed="rId3"/>
+          <a:stretch>
+            <a:fillRect/>
+          </a:stretch>
+        </p:blipFill>
+        <p:spPr>
+          <a:xfrm>
+            <a:off x="7837974" y="0"/>
+            <a:ext cx="4345145" cy="6858000"/>
+          </a:xfrm>
+          <a:prstGeom prst="rect">
+            <a:avLst/>
+          </a:prstGeom>
+        </p:spPr>
+      </p:pic>
+      <p:sp>
+        <p:nvSpPr>
+          <p:cNvPr id="8" name="Rectangle: Rounded Corners 7">
+            <a:extLst>
+              <a:ext uri="{FF2B5EF4-FFF2-40B4-BE49-F238E27FC236}">
+                <a16:creationId xmlns:a16="http://schemas.microsoft.com/office/drawing/2014/main" id="{C3203816-4E05-4D83-A9B7-AAC621C3058E}"/>
+              </a:ext>
+            </a:extLst>
+          </p:cNvPr>
+          <p:cNvSpPr/>
+          <p:nvPr/>
+        </p:nvSpPr>
+        <p:spPr>
+          <a:xfrm>
+            <a:off x="3798719" y="3675355"/>
+            <a:ext cx="1794299" cy="914400"/>
+          </a:xfrm>
+          <a:prstGeom prst="roundRect">
+            <a:avLst/>
+          </a:prstGeom>
+          <a:noFill/>
+          <a:ln w="38100">
+            <a:solidFill>
+              <a:srgbClr val="00B0F0"/>
+            </a:solidFill>
+          </a:ln>
+        </p:spPr>
+        <p:style>
+          <a:lnRef idx="2">
+            <a:schemeClr val="accent1">
+              <a:shade val="50000"/>
+            </a:schemeClr>
+          </a:lnRef>
+          <a:fillRef idx="1">
+            <a:schemeClr val="accent1"/>
+          </a:fillRef>
+          <a:effectRef idx="0">
+            <a:schemeClr val="accent1"/>
+          </a:effectRef>
+          <a:fontRef idx="minor">
+            <a:schemeClr val="lt1"/>
+          </a:fontRef>
+        </p:style>
+        <p:txBody>
+          <a:bodyPr rtlCol="0" anchor="ctr"/>
+          <a:lstStyle/>
+          <a:p>
+            <a:pPr algn="ctr"/>
+            <a:endParaRPr lang="en-US"/>
+          </a:p>
+        </p:txBody>
+      </p:sp>
+      <p:sp>
+        <p:nvSpPr>
+          <p:cNvPr id="11" name="Rectangle: Rounded Corners 10">
+            <a:extLst>
+              <a:ext uri="{FF2B5EF4-FFF2-40B4-BE49-F238E27FC236}">
+                <a16:creationId xmlns:a16="http://schemas.microsoft.com/office/drawing/2014/main" id="{53270305-A777-4797-BD7D-AFEBF085D7A6}"/>
+              </a:ext>
+            </a:extLst>
+          </p:cNvPr>
+          <p:cNvSpPr/>
+          <p:nvPr/>
+        </p:nvSpPr>
+        <p:spPr>
+          <a:xfrm>
+            <a:off x="7837973" y="4492101"/>
+            <a:ext cx="1794299" cy="550416"/>
+          </a:xfrm>
+          <a:prstGeom prst="roundRect">
+            <a:avLst/>
+          </a:prstGeom>
+          <a:noFill/>
+          <a:ln w="38100">
+            <a:solidFill>
+              <a:srgbClr val="00B0F0"/>
+            </a:solidFill>
+          </a:ln>
+        </p:spPr>
+        <p:style>
+          <a:lnRef idx="2">
+            <a:schemeClr val="accent1">
+              <a:shade val="50000"/>
+            </a:schemeClr>
+          </a:lnRef>
+          <a:fillRef idx="1">
+            <a:schemeClr val="accent1"/>
+          </a:fillRef>
+          <a:effectRef idx="0">
+            <a:schemeClr val="accent1"/>
+          </a:effectRef>
+          <a:fontRef idx="minor">
+            <a:schemeClr val="lt1"/>
+          </a:fontRef>
+        </p:style>
+        <p:txBody>
+          <a:bodyPr rtlCol="0" anchor="ctr"/>
+          <a:lstStyle/>
+          <a:p>
+            <a:pPr algn="ctr"/>
+            <a:endParaRPr lang="en-US"/>
+          </a:p>
+        </p:txBody>
+      </p:sp>
+      <p:sp>
+        <p:nvSpPr>
+          <p:cNvPr id="12" name="Rectangle: Rounded Corners 11">
+            <a:extLst>
+              <a:ext uri="{FF2B5EF4-FFF2-40B4-BE49-F238E27FC236}">
+                <a16:creationId xmlns:a16="http://schemas.microsoft.com/office/drawing/2014/main" id="{2B81C3B0-D549-43BF-85B3-E51D96D3C8DF}"/>
+              </a:ext>
+            </a:extLst>
+          </p:cNvPr>
+          <p:cNvSpPr/>
+          <p:nvPr/>
+        </p:nvSpPr>
+        <p:spPr>
+          <a:xfrm>
+            <a:off x="7837973" y="5825231"/>
+            <a:ext cx="1794299" cy="550416"/>
+          </a:xfrm>
+          <a:prstGeom prst="roundRect">
+            <a:avLst/>
+          </a:prstGeom>
+          <a:noFill/>
+          <a:ln w="38100">
+            <a:solidFill>
+              <a:srgbClr val="00B0F0"/>
+            </a:solidFill>
+          </a:ln>
+        </p:spPr>
+        <p:style>
+          <a:lnRef idx="2">
+            <a:schemeClr val="accent1">
+              <a:shade val="50000"/>
+            </a:schemeClr>
+          </a:lnRef>
+          <a:fillRef idx="1">
+            <a:schemeClr val="accent1"/>
+          </a:fillRef>
+          <a:effectRef idx="0">
+            <a:schemeClr val="accent1"/>
+          </a:effectRef>
+          <a:fontRef idx="minor">
+            <a:schemeClr val="lt1"/>
+          </a:fontRef>
+        </p:style>
+        <p:txBody>
+          <a:bodyPr rtlCol="0" anchor="ctr"/>
+          <a:lstStyle/>
+          <a:p>
+            <a:pPr algn="ctr"/>
             <a:endParaRPr lang="en-US"/>
           </a:p>
         </p:txBody>
@@ -5207,10 +5909,10 @@
       </p:grpSpPr>
       <p:sp>
         <p:nvSpPr>
-          <p:cNvPr id="4" name="Title 3">
+          <p:cNvPr id="2" name="Title 1">
             <a:extLst>
               <a:ext uri="{FF2B5EF4-FFF2-40B4-BE49-F238E27FC236}">
-                <a16:creationId xmlns:a16="http://schemas.microsoft.com/office/drawing/2014/main" id="{54CC7AE9-5F27-48FE-9AC5-A051E0A09271}"/>
+                <a16:creationId xmlns:a16="http://schemas.microsoft.com/office/drawing/2014/main" id="{7AAD862A-EC9D-4312-B4DD-C375C7005001}"/>
               </a:ext>
             </a:extLst>
           </p:cNvPr>
@@ -5218,7 +5920,7 @@
             <a:spLocks noGrp="1"/>
           </p:cNvSpPr>
           <p:nvPr>
-            <p:ph type="ctrTitle"/>
+            <p:ph type="title"/>
           </p:nvPr>
         </p:nvSpPr>
         <p:spPr/>
@@ -5228,15 +5930,223 @@
           <a:p>
             <a:r>
               <a:rPr lang="en-US" dirty="0"/>
-              <a:t>DEMO</a:t>
-            </a:r>
+              <a:t>Use Cases</a:t>
+            </a:r>
+          </a:p>
+        </p:txBody>
+      </p:sp>
+      <p:sp>
+        <p:nvSpPr>
+          <p:cNvPr id="3" name="Content Placeholder 2">
+            <a:extLst>
+              <a:ext uri="{FF2B5EF4-FFF2-40B4-BE49-F238E27FC236}">
+                <a16:creationId xmlns:a16="http://schemas.microsoft.com/office/drawing/2014/main" id="{43C2AC74-9547-46B6-AD10-35F0C41FDAA4}"/>
+              </a:ext>
+            </a:extLst>
+          </p:cNvPr>
+          <p:cNvSpPr>
+            <a:spLocks noGrp="1"/>
+          </p:cNvSpPr>
+          <p:nvPr>
+            <p:ph idx="1"/>
+          </p:nvPr>
+        </p:nvSpPr>
+        <p:spPr>
+          <a:xfrm>
+            <a:off x="1066800" y="2103120"/>
+            <a:ext cx="2652944" cy="1371600"/>
+          </a:xfrm>
+        </p:spPr>
+        <p:txBody>
+          <a:bodyPr>
+            <a:normAutofit/>
+          </a:bodyPr>
+          <a:lstStyle/>
+          <a:p>
+            <a:pPr marL="0" indent="0">
+              <a:buNone/>
+            </a:pPr>
+            <a:r>
+              <a:rPr lang="en-US" sz="1800" dirty="0"/>
+              <a:t>Given a query</a:t>
+            </a:r>
+          </a:p>
+          <a:p>
+            <a:r>
+              <a:rPr lang="en-US" sz="1800" dirty="0"/>
+              <a:t>Get related key words and phrases</a:t>
+            </a:r>
+          </a:p>
+        </p:txBody>
+      </p:sp>
+      <p:pic>
+        <p:nvPicPr>
+          <p:cNvPr id="6" name="Picture 5">
+            <a:extLst>
+              <a:ext uri="{FF2B5EF4-FFF2-40B4-BE49-F238E27FC236}">
+                <a16:creationId xmlns:a16="http://schemas.microsoft.com/office/drawing/2014/main" id="{C19AF6E2-E9AC-4FE3-BD5D-DF576021C093}"/>
+              </a:ext>
+            </a:extLst>
+          </p:cNvPr>
+          <p:cNvPicPr>
+            <a:picLocks noChangeAspect="1"/>
+          </p:cNvPicPr>
+          <p:nvPr/>
+        </p:nvPicPr>
+        <p:blipFill>
+          <a:blip r:embed="rId2"/>
+          <a:stretch>
+            <a:fillRect/>
+          </a:stretch>
+        </p:blipFill>
+        <p:spPr>
+          <a:xfrm>
+            <a:off x="4201957" y="1414822"/>
+            <a:ext cx="6753225" cy="1838325"/>
+          </a:xfrm>
+          <a:prstGeom prst="rect">
+            <a:avLst/>
+          </a:prstGeom>
+        </p:spPr>
+      </p:pic>
+      <p:pic>
+        <p:nvPicPr>
+          <p:cNvPr id="10" name="Picture 9">
+            <a:extLst>
+              <a:ext uri="{FF2B5EF4-FFF2-40B4-BE49-F238E27FC236}">
+                <a16:creationId xmlns:a16="http://schemas.microsoft.com/office/drawing/2014/main" id="{A1042F70-6313-4495-A92C-F385E99CAAB2}"/>
+              </a:ext>
+            </a:extLst>
+          </p:cNvPr>
+          <p:cNvPicPr>
+            <a:picLocks noChangeAspect="1"/>
+          </p:cNvPicPr>
+          <p:nvPr/>
+        </p:nvPicPr>
+        <p:blipFill>
+          <a:blip r:embed="rId3"/>
+          <a:stretch>
+            <a:fillRect/>
+          </a:stretch>
+        </p:blipFill>
+        <p:spPr>
+          <a:xfrm>
+            <a:off x="1511144" y="3929756"/>
+            <a:ext cx="6067425" cy="1895475"/>
+          </a:xfrm>
+          <a:prstGeom prst="rect">
+            <a:avLst/>
+          </a:prstGeom>
+        </p:spPr>
+      </p:pic>
+      <p:sp>
+        <p:nvSpPr>
+          <p:cNvPr id="11" name="Rectangle: Rounded Corners 10">
+            <a:extLst>
+              <a:ext uri="{FF2B5EF4-FFF2-40B4-BE49-F238E27FC236}">
+                <a16:creationId xmlns:a16="http://schemas.microsoft.com/office/drawing/2014/main" id="{53270305-A777-4797-BD7D-AFEBF085D7A6}"/>
+              </a:ext>
+            </a:extLst>
+          </p:cNvPr>
+          <p:cNvSpPr/>
+          <p:nvPr/>
+        </p:nvSpPr>
+        <p:spPr>
+          <a:xfrm>
+            <a:off x="7837973" y="2574525"/>
+            <a:ext cx="3117209" cy="550416"/>
+          </a:xfrm>
+          <a:prstGeom prst="roundRect">
+            <a:avLst/>
+          </a:prstGeom>
+          <a:noFill/>
+          <a:ln w="38100">
+            <a:solidFill>
+              <a:srgbClr val="00B0F0"/>
+            </a:solidFill>
+          </a:ln>
+        </p:spPr>
+        <p:style>
+          <a:lnRef idx="2">
+            <a:schemeClr val="accent1">
+              <a:shade val="50000"/>
+            </a:schemeClr>
+          </a:lnRef>
+          <a:fillRef idx="1">
+            <a:schemeClr val="accent1"/>
+          </a:fillRef>
+          <a:effectRef idx="0">
+            <a:schemeClr val="accent1"/>
+          </a:effectRef>
+          <a:fontRef idx="minor">
+            <a:schemeClr val="lt1"/>
+          </a:fontRef>
+        </p:style>
+        <p:txBody>
+          <a:bodyPr rtlCol="0" anchor="ctr"/>
+          <a:lstStyle/>
+          <a:p>
+            <a:pPr algn="ctr"/>
+            <a:endParaRPr lang="en-US"/>
+          </a:p>
+        </p:txBody>
+      </p:sp>
+      <p:sp>
+        <p:nvSpPr>
+          <p:cNvPr id="13" name="Rectangle: Rounded Corners 12">
+            <a:extLst>
+              <a:ext uri="{FF2B5EF4-FFF2-40B4-BE49-F238E27FC236}">
+                <a16:creationId xmlns:a16="http://schemas.microsoft.com/office/drawing/2014/main" id="{3017BFE0-6FEF-4B60-92BB-2A75F29A3435}"/>
+              </a:ext>
+            </a:extLst>
+          </p:cNvPr>
+          <p:cNvSpPr/>
+          <p:nvPr/>
+        </p:nvSpPr>
+        <p:spPr>
+          <a:xfrm>
+            <a:off x="1616206" y="5274815"/>
+            <a:ext cx="5867670" cy="550416"/>
+          </a:xfrm>
+          <a:prstGeom prst="roundRect">
+            <a:avLst/>
+          </a:prstGeom>
+          <a:noFill/>
+          <a:ln w="38100">
+            <a:solidFill>
+              <a:srgbClr val="00B0F0"/>
+            </a:solidFill>
+          </a:ln>
+        </p:spPr>
+        <p:style>
+          <a:lnRef idx="2">
+            <a:schemeClr val="accent1">
+              <a:shade val="50000"/>
+            </a:schemeClr>
+          </a:lnRef>
+          <a:fillRef idx="1">
+            <a:schemeClr val="accent1"/>
+          </a:fillRef>
+          <a:effectRef idx="0">
+            <a:schemeClr val="accent1"/>
+          </a:effectRef>
+          <a:fontRef idx="minor">
+            <a:schemeClr val="lt1"/>
+          </a:fontRef>
+        </p:style>
+        <p:txBody>
+          <a:bodyPr rtlCol="0" anchor="ctr"/>
+          <a:lstStyle/>
+          <a:p>
+            <a:pPr algn="ctr"/>
+            <a:endParaRPr lang="en-US"/>
           </a:p>
         </p:txBody>
       </p:sp>
     </p:spTree>
     <p:extLst>
       <p:ext uri="{BB962C8B-B14F-4D97-AF65-F5344CB8AC3E}">
-        <p14:creationId xmlns:p14="http://schemas.microsoft.com/office/powerpoint/2010/main" val="3104619600"/>
+        <p14:creationId xmlns:p14="http://schemas.microsoft.com/office/powerpoint/2010/main" val="3122937652"/>
       </p:ext>
     </p:extLst>
   </p:cSld>
@@ -5265,10 +6175,10 @@
       </p:grpSpPr>
       <p:sp>
         <p:nvSpPr>
-          <p:cNvPr id="2" name="Title 1">
+          <p:cNvPr id="4" name="Title 3">
             <a:extLst>
               <a:ext uri="{FF2B5EF4-FFF2-40B4-BE49-F238E27FC236}">
-                <a16:creationId xmlns:a16="http://schemas.microsoft.com/office/drawing/2014/main" id="{9E85CA03-4D6C-4350-A0D6-D374291915BA}"/>
+                <a16:creationId xmlns:a16="http://schemas.microsoft.com/office/drawing/2014/main" id="{54CC7AE9-5F27-48FE-9AC5-A051E0A09271}"/>
               </a:ext>
             </a:extLst>
           </p:cNvPr>
@@ -5276,7 +6186,7 @@
             <a:spLocks noGrp="1"/>
           </p:cNvSpPr>
           <p:nvPr>
-            <p:ph type="title"/>
+            <p:ph type="ctrTitle"/>
           </p:nvPr>
         </p:nvSpPr>
         <p:spPr/>
@@ -5286,40 +6196,15 @@
           <a:p>
             <a:r>
               <a:rPr lang="en-US" dirty="0"/>
-              <a:t>Design</a:t>
-            </a:r>
-          </a:p>
-        </p:txBody>
-      </p:sp>
-      <p:sp>
-        <p:nvSpPr>
-          <p:cNvPr id="3" name="Content Placeholder 2">
-            <a:extLst>
-              <a:ext uri="{FF2B5EF4-FFF2-40B4-BE49-F238E27FC236}">
-                <a16:creationId xmlns:a16="http://schemas.microsoft.com/office/drawing/2014/main" id="{BB1CC800-E1EC-4F42-9D20-789390E4CFC3}"/>
-              </a:ext>
-            </a:extLst>
-          </p:cNvPr>
-          <p:cNvSpPr>
-            <a:spLocks noGrp="1"/>
-          </p:cNvSpPr>
-          <p:nvPr>
-            <p:ph idx="1"/>
-          </p:nvPr>
-        </p:nvSpPr>
-        <p:spPr/>
-        <p:txBody>
-          <a:bodyPr/>
-          <a:lstStyle/>
-          <a:p>
-            <a:endParaRPr lang="en-US"/>
+              <a:t>DEMO</a:t>
+            </a:r>
           </a:p>
         </p:txBody>
       </p:sp>
     </p:spTree>
     <p:extLst>
       <p:ext uri="{BB962C8B-B14F-4D97-AF65-F5344CB8AC3E}">
-        <p14:creationId xmlns:p14="http://schemas.microsoft.com/office/powerpoint/2010/main" val="1608319671"/>
+        <p14:creationId xmlns:p14="http://schemas.microsoft.com/office/powerpoint/2010/main" val="3104619600"/>
       </p:ext>
     </p:extLst>
   </p:cSld>
@@ -5351,7 +6236,7 @@
           <p:cNvPr id="2" name="Title 1">
             <a:extLst>
               <a:ext uri="{FF2B5EF4-FFF2-40B4-BE49-F238E27FC236}">
-                <a16:creationId xmlns:a16="http://schemas.microsoft.com/office/drawing/2014/main" id="{25F4AA2F-5522-46E4-B9C9-0CC9B8AE2119}"/>
+                <a16:creationId xmlns:a16="http://schemas.microsoft.com/office/drawing/2014/main" id="{9E85CA03-4D6C-4350-A0D6-D374291915BA}"/>
               </a:ext>
             </a:extLst>
           </p:cNvPr>
@@ -5359,7 +6244,7 @@
             <a:spLocks noGrp="1"/>
           </p:cNvSpPr>
           <p:nvPr>
-            <p:ph type="ctrTitle"/>
+            <p:ph type="title"/>
           </p:nvPr>
         </p:nvSpPr>
         <p:spPr/>
@@ -5369,7 +6254,104 @@
           <a:p>
             <a:r>
               <a:rPr lang="en-US" dirty="0"/>
-              <a:t>Project Structure</a:t>
+              <a:t>Design</a:t>
+            </a:r>
+          </a:p>
+        </p:txBody>
+      </p:sp>
+      <p:sp>
+        <p:nvSpPr>
+          <p:cNvPr id="3" name="Content Placeholder 2">
+            <a:extLst>
+              <a:ext uri="{FF2B5EF4-FFF2-40B4-BE49-F238E27FC236}">
+                <a16:creationId xmlns:a16="http://schemas.microsoft.com/office/drawing/2014/main" id="{BB1CC800-E1EC-4F42-9D20-789390E4CFC3}"/>
+              </a:ext>
+            </a:extLst>
+          </p:cNvPr>
+          <p:cNvSpPr>
+            <a:spLocks noGrp="1"/>
+          </p:cNvSpPr>
+          <p:nvPr>
+            <p:ph idx="1"/>
+          </p:nvPr>
+        </p:nvSpPr>
+        <p:spPr/>
+        <p:txBody>
+          <a:bodyPr>
+            <a:normAutofit/>
+          </a:bodyPr>
+          <a:lstStyle/>
+          <a:p>
+            <a:r>
+              <a:rPr lang="en-US" sz="1800" dirty="0" err="1"/>
+              <a:t>Textsimilarity</a:t>
+            </a:r>
+            <a:r>
+              <a:rPr lang="en-US" sz="1800" dirty="0"/>
+              <a:t> package has 3 modules separated by functionality and purpose</a:t>
+            </a:r>
+          </a:p>
+          <a:p>
+            <a:pPr lvl="1"/>
+            <a:r>
+              <a:rPr lang="en-US" sz="1800" dirty="0"/>
+              <a:t>Cleaning text</a:t>
+            </a:r>
+          </a:p>
+          <a:p>
+            <a:pPr lvl="2"/>
+            <a:r>
+              <a:rPr lang="en-US" sz="1800" dirty="0"/>
+              <a:t>Class to load supporting dictionaries and instances only once during initialization</a:t>
+            </a:r>
+          </a:p>
+          <a:p>
+            <a:pPr lvl="2"/>
+            <a:r>
+              <a:rPr lang="en-US" sz="1800" dirty="0"/>
+              <a:t>Private method for calculating the Jaccard distance as a helper for spelling correction</a:t>
+            </a:r>
+          </a:p>
+          <a:p>
+            <a:pPr lvl="1"/>
+            <a:r>
+              <a:rPr lang="en-US" sz="1800" dirty="0"/>
+              <a:t>Loading a language model</a:t>
+            </a:r>
+          </a:p>
+          <a:p>
+            <a:pPr lvl="2"/>
+            <a:r>
+              <a:rPr lang="en-US" sz="1800" dirty="0"/>
+              <a:t>One class per model to load</a:t>
+            </a:r>
+          </a:p>
+          <a:p>
+            <a:pPr lvl="2"/>
+            <a:r>
+              <a:rPr lang="en-US" sz="1800" dirty="0"/>
+              <a:t>Private methods for tokenizing data and retrieving text embeddings </a:t>
+            </a:r>
+          </a:p>
+          <a:p>
+            <a:pPr lvl="1"/>
+            <a:r>
+              <a:rPr lang="en-US" sz="1800" dirty="0"/>
+              <a:t>Ranking a text corpus</a:t>
+            </a:r>
+          </a:p>
+          <a:p>
+            <a:pPr lvl="2"/>
+            <a:r>
+              <a:rPr lang="en-US" sz="1800" dirty="0"/>
+              <a:t>One class per ranker</a:t>
+            </a:r>
+          </a:p>
+          <a:p>
+            <a:pPr lvl="2"/>
+            <a:r>
+              <a:rPr lang="en-US" sz="1800" dirty="0"/>
+              <a:t>Private methods for calculating cosine similarity and creating a dictionary of embeddings</a:t>
             </a:r>
           </a:p>
         </p:txBody>
@@ -5377,7 +6359,7 @@
     </p:spTree>
     <p:extLst>
       <p:ext uri="{BB962C8B-B14F-4D97-AF65-F5344CB8AC3E}">
-        <p14:creationId xmlns:p14="http://schemas.microsoft.com/office/powerpoint/2010/main" val="2485799054"/>
+        <p14:creationId xmlns:p14="http://schemas.microsoft.com/office/powerpoint/2010/main" val="1608319671"/>
       </p:ext>
     </p:extLst>
   </p:cSld>
@@ -5409,7 +6391,7 @@
           <p:cNvPr id="2" name="Title 1">
             <a:extLst>
               <a:ext uri="{FF2B5EF4-FFF2-40B4-BE49-F238E27FC236}">
-                <a16:creationId xmlns:a16="http://schemas.microsoft.com/office/drawing/2014/main" id="{B8B1CC71-056D-4411-A7DB-3491E90D4B4F}"/>
+                <a16:creationId xmlns:a16="http://schemas.microsoft.com/office/drawing/2014/main" id="{9E85CA03-4D6C-4350-A0D6-D374291915BA}"/>
               </a:ext>
             </a:extLst>
           </p:cNvPr>
@@ -5427,7 +6409,7 @@
           <a:p>
             <a:r>
               <a:rPr lang="en-US" dirty="0"/>
-              <a:t>Lessons Learned</a:t>
+              <a:t>Design</a:t>
             </a:r>
           </a:p>
         </p:txBody>
@@ -5437,7 +6419,7 @@
           <p:cNvPr id="3" name="Content Placeholder 2">
             <a:extLst>
               <a:ext uri="{FF2B5EF4-FFF2-40B4-BE49-F238E27FC236}">
-                <a16:creationId xmlns:a16="http://schemas.microsoft.com/office/drawing/2014/main" id="{3FA8D2B1-A747-498B-814E-683AA5AE5591}"/>
+                <a16:creationId xmlns:a16="http://schemas.microsoft.com/office/drawing/2014/main" id="{BB1CC800-E1EC-4F42-9D20-789390E4CFC3}"/>
               </a:ext>
             </a:extLst>
           </p:cNvPr>
@@ -5450,161 +6432,85 @@
         </p:nvSpPr>
         <p:spPr>
           <a:xfrm>
-            <a:off x="1066800" y="1766656"/>
-            <a:ext cx="10740500" cy="4678532"/>
+            <a:off x="1066800" y="2103120"/>
+            <a:ext cx="5262979" cy="3849624"/>
           </a:xfrm>
         </p:spPr>
         <p:txBody>
           <a:bodyPr>
-            <a:normAutofit/>
+            <a:noAutofit/>
           </a:bodyPr>
           <a:lstStyle/>
           <a:p>
             <a:r>
-              <a:rPr lang="en-US" sz="2000" dirty="0"/>
-              <a:t>Tools</a:t>
+              <a:rPr lang="en-US" sz="1800" dirty="0"/>
+              <a:t>The ranker objects in the rankers module take in a language model as an input parameter. </a:t>
             </a:r>
           </a:p>
           <a:p>
             <a:pPr lvl="1"/>
             <a:r>
               <a:rPr lang="en-US" sz="1800" dirty="0"/>
-              <a:t>Travis-CI</a:t>
-            </a:r>
-          </a:p>
-          <a:p>
-            <a:pPr lvl="2"/>
+              <a:t>Allows language model complexity to remain abstracted from the user.</a:t>
+            </a:r>
+          </a:p>
+          <a:p>
+            <a:pPr lvl="1"/>
             <a:r>
               <a:rPr lang="en-US" sz="1800" dirty="0"/>
-              <a:t>Different python versions</a:t>
-            </a:r>
-          </a:p>
-          <a:p>
-            <a:pPr lvl="2"/>
+              <a:t>Calls private methods in the model object to tokenize the data and get embeddings.</a:t>
+            </a:r>
+          </a:p>
+          <a:p>
+            <a:pPr lvl="1"/>
             <a:r>
               <a:rPr lang="en-US" sz="1800" dirty="0"/>
-              <a:t>Run all tests &amp; generate coverage report</a:t>
-            </a:r>
-          </a:p>
-          <a:p>
-            <a:pPr lvl="1"/>
+              <a:t>To rank the corpus based on a given text, the user just needs to call </a:t>
+            </a:r>
             <a:r>
               <a:rPr lang="en-US" sz="1800" dirty="0" err="1"/>
-              <a:t>Unittest</a:t>
-            </a:r>
-            <a:endParaRPr lang="en-US" sz="1800" dirty="0"/>
-          </a:p>
-          <a:p>
-            <a:pPr lvl="2"/>
+              <a:t>rank_on_similarity</a:t>
+            </a:r>
             <a:r>
               <a:rPr lang="en-US" sz="1800" dirty="0"/>
-              <a:t>Set up / tear down methods </a:t>
-            </a:r>
-          </a:p>
-          <a:p>
-            <a:r>
-              <a:rPr lang="en-US" sz="2000" dirty="0"/>
-              <a:t>Design</a:t>
-            </a:r>
-          </a:p>
-          <a:p>
-            <a:pPr lvl="1"/>
-            <a:r>
-              <a:rPr lang="en-US" sz="1800" dirty="0"/>
-              <a:t>Verb or action prefix on methods for clarity: “calculate”, “get”, “tokenize”, “rank”</a:t>
-            </a:r>
-          </a:p>
-          <a:p>
-            <a:pPr lvl="2"/>
-            <a:r>
-              <a:rPr lang="en-US" sz="1800" dirty="0"/>
-              <a:t>Easier to understand, clearer expectations </a:t>
-            </a:r>
-          </a:p>
-          <a:p>
-            <a:pPr lvl="1"/>
-            <a:r>
-              <a:rPr lang="en-US" sz="1800" dirty="0"/>
-              <a:t>Separating functionality: modules, classes, methods</a:t>
-            </a:r>
-          </a:p>
-          <a:p>
-            <a:pPr lvl="2"/>
-            <a:r>
-              <a:rPr lang="en-US" sz="1800" dirty="0"/>
-              <a:t>Easily extendable and modifiable </a:t>
-            </a:r>
-          </a:p>
-          <a:p>
-            <a:pPr lvl="1"/>
-            <a:r>
-              <a:rPr lang="en-US" sz="1800" dirty="0"/>
-              <a:t>Abstraction, information hiding</a:t>
-            </a:r>
-          </a:p>
-          <a:p>
-            <a:pPr lvl="2"/>
-            <a:r>
-              <a:rPr lang="en-US" sz="1800" dirty="0"/>
-              <a:t>Easier to use</a:t>
+              <a:t>() passing in the target text.</a:t>
             </a:r>
           </a:p>
         </p:txBody>
       </p:sp>
       <p:pic>
         <p:nvPicPr>
-          <p:cNvPr id="1028" name="Picture 4" descr="See the source image">
+          <p:cNvPr id="25" name="Picture 24">
             <a:extLst>
               <a:ext uri="{FF2B5EF4-FFF2-40B4-BE49-F238E27FC236}">
-                <a16:creationId xmlns:a16="http://schemas.microsoft.com/office/drawing/2014/main" id="{6C721652-B7A2-4EB4-B098-B758FA70A3C3}"/>
+                <a16:creationId xmlns:a16="http://schemas.microsoft.com/office/drawing/2014/main" id="{CC060585-D60A-4DB3-AF0E-65892056B21E}"/>
               </a:ext>
             </a:extLst>
           </p:cNvPr>
           <p:cNvPicPr>
-            <a:picLocks noChangeAspect="1" noChangeArrowheads="1"/>
+            <a:picLocks noChangeAspect="1"/>
           </p:cNvPicPr>
           <p:nvPr/>
         </p:nvPicPr>
-        <p:blipFill>
-          <a:blip r:embed="rId2">
-            <a:extLst>
-              <a:ext uri="{28A0092B-C50C-407E-A947-70E740481C1C}">
-                <a14:useLocalDpi xmlns:a14="http://schemas.microsoft.com/office/drawing/2010/main" val="0"/>
-              </a:ext>
-            </a:extLst>
-          </a:blip>
-          <a:srcRect/>
-          <a:stretch>
-            <a:fillRect/>
-          </a:stretch>
+        <p:blipFill rotWithShape="1">
+          <a:blip r:embed="rId2"/>
+          <a:srcRect r="3778"/>
+          <a:stretch/>
         </p:blipFill>
-        <p:spPr bwMode="auto">
-          <a:xfrm>
-            <a:off x="6811212" y="771657"/>
-            <a:ext cx="4658738" cy="2720063"/>
+        <p:spPr>
+          <a:xfrm>
+            <a:off x="6391923" y="2443507"/>
+            <a:ext cx="5471604" cy="2400300"/>
           </a:xfrm>
           <a:prstGeom prst="rect">
             <a:avLst/>
           </a:prstGeom>
-          <a:noFill/>
-          <a:effectLst>
-            <a:softEdge rad="31750"/>
-          </a:effectLst>
-          <a:extLst>
-            <a:ext uri="{909E8E84-426E-40DD-AFC4-6F175D3DCCD1}">
-              <a14:hiddenFill xmlns:a14="http://schemas.microsoft.com/office/drawing/2010/main">
-                <a:solidFill>
-                  <a:srgbClr val="FFFFFF"/>
-                </a:solidFill>
-              </a14:hiddenFill>
-            </a:ext>
-          </a:extLst>
         </p:spPr>
       </p:pic>
     </p:spTree>
     <p:extLst>
       <p:ext uri="{BB962C8B-B14F-4D97-AF65-F5344CB8AC3E}">
-        <p14:creationId xmlns:p14="http://schemas.microsoft.com/office/powerpoint/2010/main" val="94631367"/>
+        <p14:creationId xmlns:p14="http://schemas.microsoft.com/office/powerpoint/2010/main" val="2627781268"/>
       </p:ext>
     </p:extLst>
   </p:cSld>
@@ -5636,7 +6542,7 @@
           <p:cNvPr id="2" name="Title 1">
             <a:extLst>
               <a:ext uri="{FF2B5EF4-FFF2-40B4-BE49-F238E27FC236}">
-                <a16:creationId xmlns:a16="http://schemas.microsoft.com/office/drawing/2014/main" id="{DEBCB79F-46A5-4A6E-8DE9-E7C430C4664F}"/>
+                <a16:creationId xmlns:a16="http://schemas.microsoft.com/office/drawing/2014/main" id="{4F2FB145-7804-4F32-9831-0B3409322E19}"/>
               </a:ext>
             </a:extLst>
           </p:cNvPr>
@@ -5654,7 +6560,7 @@
           <a:p>
             <a:r>
               <a:rPr lang="en-US" dirty="0"/>
-              <a:t>Future Work</a:t>
+              <a:t>Design</a:t>
             </a:r>
           </a:p>
         </p:txBody>
@@ -5664,7 +6570,7 @@
           <p:cNvPr id="3" name="Content Placeholder 2">
             <a:extLst>
               <a:ext uri="{FF2B5EF4-FFF2-40B4-BE49-F238E27FC236}">
-                <a16:creationId xmlns:a16="http://schemas.microsoft.com/office/drawing/2014/main" id="{3BEA30E2-793E-4813-A476-4780B5AB739C}"/>
+                <a16:creationId xmlns:a16="http://schemas.microsoft.com/office/drawing/2014/main" id="{5E995880-AABA-471F-8893-EABA1C7B22DC}"/>
               </a:ext>
             </a:extLst>
           </p:cNvPr>
@@ -5675,134 +6581,99 @@
             <p:ph idx="1"/>
           </p:nvPr>
         </p:nvSpPr>
-        <p:spPr>
-          <a:xfrm>
-            <a:off x="1066800" y="1779321"/>
-            <a:ext cx="10058400" cy="4745765"/>
-          </a:xfrm>
-        </p:spPr>
-        <p:txBody>
-          <a:bodyPr>
-            <a:noAutofit/>
-          </a:bodyPr>
+        <p:spPr/>
+        <p:txBody>
+          <a:bodyPr/>
           <a:lstStyle/>
           <a:p>
-            <a:pPr marL="0" indent="0">
-              <a:buNone/>
-            </a:pPr>
-            <a:r>
-              <a:rPr lang="en-US" sz="1800" dirty="0"/>
-              <a:t>In the package:</a:t>
-            </a:r>
-          </a:p>
-          <a:p>
-            <a:r>
-              <a:rPr lang="en-US" sz="1800" dirty="0"/>
-              <a:t>Cross-modality expansion such as with text to image similarity </a:t>
-            </a:r>
-          </a:p>
-          <a:p>
-            <a:pPr marL="0" indent="0">
-              <a:buNone/>
-            </a:pPr>
-            <a:endParaRPr lang="en-US" sz="1800" dirty="0"/>
-          </a:p>
-          <a:p>
-            <a:pPr marL="0" indent="0">
-              <a:buNone/>
-            </a:pPr>
-            <a:r>
-              <a:rPr lang="en-US" sz="1800" dirty="0"/>
-              <a:t>In the clean text module and text models module:</a:t>
-            </a:r>
-          </a:p>
-          <a:p>
-            <a:r>
-              <a:rPr lang="en-US" sz="1800" dirty="0"/>
-              <a:t>Add support for other languages besides English</a:t>
-            </a:r>
-          </a:p>
-          <a:p>
-            <a:pPr marL="0" indent="0">
-              <a:buNone/>
-            </a:pPr>
-            <a:endParaRPr lang="en-US" sz="1800" dirty="0"/>
-          </a:p>
-          <a:p>
-            <a:pPr marL="0" indent="0">
-              <a:buNone/>
-            </a:pPr>
-            <a:r>
-              <a:rPr lang="en-US" sz="1800" dirty="0"/>
-              <a:t>In text models module:</a:t>
-            </a:r>
-          </a:p>
-          <a:p>
-            <a:r>
-              <a:rPr lang="en-US" sz="1800" dirty="0"/>
-              <a:t>Add more natural language models </a:t>
-            </a:r>
-          </a:p>
-          <a:p>
-            <a:endParaRPr lang="en-US" sz="1800" dirty="0"/>
-          </a:p>
-          <a:p>
-            <a:pPr marL="0" indent="0">
-              <a:buNone/>
-            </a:pPr>
-            <a:r>
-              <a:rPr lang="en-US" sz="1800" dirty="0"/>
-              <a:t>In the rankers module:</a:t>
-            </a:r>
-          </a:p>
-          <a:p>
-            <a:r>
-              <a:rPr lang="en-US" sz="1800" dirty="0"/>
-              <a:t>Add other rankers</a:t>
-            </a:r>
-          </a:p>
-          <a:p>
-            <a:endParaRPr lang="en-US" sz="1800" dirty="0"/>
-          </a:p>
-        </p:txBody>
-      </p:sp>
-      <p:pic>
-        <p:nvPicPr>
-          <p:cNvPr id="7" name="Picture 6">
+            <a:r>
+              <a:rPr lang="en-US" sz="1600" dirty="0"/>
+              <a:t>The </a:t>
+            </a:r>
+            <a:r>
+              <a:rPr lang="en-US" sz="1600" dirty="0" err="1"/>
+              <a:t>CleanText</a:t>
+            </a:r>
+            <a:r>
+              <a:rPr lang="en-US" sz="1600" dirty="0"/>
+              <a:t> object allows users to have better ranked results by not including profane text and by correcting spelling errors; however, if for instance a user knew their text was already clean then they could choose to save time and skip this step. Then they could continue to use the </a:t>
+            </a:r>
+            <a:r>
+              <a:rPr lang="en-US" sz="1600" dirty="0" err="1"/>
+              <a:t>text_models</a:t>
+            </a:r>
+            <a:r>
+              <a:rPr lang="en-US" sz="1600" dirty="0"/>
+              <a:t> and rankers modules as normal. </a:t>
+            </a:r>
+          </a:p>
+          <a:p>
+            <a:endParaRPr lang="en-US" dirty="0"/>
+          </a:p>
+        </p:txBody>
+      </p:sp>
+    </p:spTree>
+    <p:extLst>
+      <p:ext uri="{BB962C8B-B14F-4D97-AF65-F5344CB8AC3E}">
+        <p14:creationId xmlns:p14="http://schemas.microsoft.com/office/powerpoint/2010/main" val="2635112193"/>
+      </p:ext>
+    </p:extLst>
+  </p:cSld>
+  <p:clrMapOvr>
+    <a:masterClrMapping/>
+  </p:clrMapOvr>
+</p:sld>
+</file>
+
+<file path=ppt/slides/slide9.xml><?xml version="1.0" encoding="utf-8"?>
+<p:sld xmlns:a="http://schemas.openxmlformats.org/drawingml/2006/main" xmlns:r="http://schemas.openxmlformats.org/officeDocument/2006/relationships" xmlns:p="http://schemas.openxmlformats.org/presentationml/2006/main">
+  <p:cSld>
+    <p:spTree>
+      <p:nvGrpSpPr>
+        <p:cNvPr id="1" name=""/>
+        <p:cNvGrpSpPr/>
+        <p:nvPr/>
+      </p:nvGrpSpPr>
+      <p:grpSpPr>
+        <a:xfrm>
+          <a:off x="0" y="0"/>
+          <a:ext cx="0" cy="0"/>
+          <a:chOff x="0" y="0"/>
+          <a:chExt cx="0" cy="0"/>
+        </a:xfrm>
+      </p:grpSpPr>
+      <p:sp>
+        <p:nvSpPr>
+          <p:cNvPr id="2" name="Title 1">
             <a:extLst>
               <a:ext uri="{FF2B5EF4-FFF2-40B4-BE49-F238E27FC236}">
-                <a16:creationId xmlns:a16="http://schemas.microsoft.com/office/drawing/2014/main" id="{154FB762-FFA2-4B54-8318-1106D127E3C6}"/>
+                <a16:creationId xmlns:a16="http://schemas.microsoft.com/office/drawing/2014/main" id="{25F4AA2F-5522-46E4-B9C9-0CC9B8AE2119}"/>
               </a:ext>
             </a:extLst>
           </p:cNvPr>
-          <p:cNvPicPr>
-            <a:picLocks noChangeAspect="1"/>
-          </p:cNvPicPr>
-          <p:nvPr/>
-        </p:nvPicPr>
-        <p:blipFill>
-          <a:blip r:embed="rId2"/>
-          <a:stretch>
-            <a:fillRect/>
-          </a:stretch>
-        </p:blipFill>
-        <p:spPr>
-          <a:xfrm>
-            <a:off x="5663952" y="3839577"/>
-            <a:ext cx="6167503" cy="2521689"/>
-          </a:xfrm>
-          <a:prstGeom prst="rect">
-            <a:avLst/>
-          </a:prstGeom>
-          <a:effectLst>
-            <a:softEdge rad="317500"/>
-          </a:effectLst>
-        </p:spPr>
-      </p:pic>
+          <p:cNvSpPr>
+            <a:spLocks noGrp="1"/>
+          </p:cNvSpPr>
+          <p:nvPr>
+            <p:ph type="ctrTitle"/>
+          </p:nvPr>
+        </p:nvSpPr>
+        <p:spPr/>
+        <p:txBody>
+          <a:bodyPr/>
+          <a:lstStyle/>
+          <a:p>
+            <a:r>
+              <a:rPr lang="en-US" dirty="0"/>
+              <a:t>Project Structure</a:t>
+            </a:r>
+          </a:p>
+        </p:txBody>
+      </p:sp>
     </p:spTree>
     <p:extLst>
       <p:ext uri="{BB962C8B-B14F-4D97-AF65-F5344CB8AC3E}">
-        <p14:creationId xmlns:p14="http://schemas.microsoft.com/office/powerpoint/2010/main" val="1160545909"/>
+        <p14:creationId xmlns:p14="http://schemas.microsoft.com/office/powerpoint/2010/main" val="2485799054"/>
       </p:ext>
     </p:extLst>
   </p:cSld>
@@ -6427,12 +7298,12 @@
 </file>
 
 <file path=customXml/item1.xml><?xml version="1.0" encoding="utf-8"?>
-<p:properties xmlns:p="http://schemas.microsoft.com/office/2006/metadata/properties" xmlns:xsi="http://www.w3.org/2001/XMLSchema-instance" xmlns:pc="http://schemas.microsoft.com/office/infopath/2007/PartnerControls">
-  <documentManagement>
-    <Status xmlns="71af3243-3dd4-4a8d-8c0d-dd76da1f02a5">Not started</Status>
-    <MediaServiceKeyPoints xmlns="71af3243-3dd4-4a8d-8c0d-dd76da1f02a5" xsi:nil="true"/>
-  </documentManagement>
-</p:properties>
+<?mso-contentType ?>
+<FormTemplates xmlns="http://schemas.microsoft.com/sharepoint/v3/contenttype/forms">
+  <Display>DocumentLibraryForm</Display>
+  <Edit>DocumentLibraryForm</Edit>
+  <New>DocumentLibraryForm</New>
+</FormTemplates>
 </file>
 
 <file path=customXml/item2.xml><?xml version="1.0" encoding="utf-8"?>
@@ -6657,20 +7528,18 @@
 </file>
 
 <file path=customXml/item3.xml><?xml version="1.0" encoding="utf-8"?>
-<?mso-contentType ?>
-<FormTemplates xmlns="http://schemas.microsoft.com/sharepoint/v3/contenttype/forms">
-  <Display>DocumentLibraryForm</Display>
-  <Edit>DocumentLibraryForm</Edit>
-  <New>DocumentLibraryForm</New>
-</FormTemplates>
+<p:properties xmlns:p="http://schemas.microsoft.com/office/2006/metadata/properties" xmlns:xsi="http://www.w3.org/2001/XMLSchema-instance" xmlns:pc="http://schemas.microsoft.com/office/infopath/2007/PartnerControls">
+  <documentManagement>
+    <Status xmlns="71af3243-3dd4-4a8d-8c0d-dd76da1f02a5">Not started</Status>
+    <MediaServiceKeyPoints xmlns="71af3243-3dd4-4a8d-8c0d-dd76da1f02a5" xsi:nil="true"/>
+  </documentManagement>
+</p:properties>
 </file>
 
 <file path=customXml/itemProps1.xml><?xml version="1.0" encoding="utf-8"?>
-<ds:datastoreItem xmlns:ds="http://schemas.openxmlformats.org/officeDocument/2006/customXml" ds:itemID="{946BCBFB-BBC7-42F1-95CD-058E172363A0}">
+<ds:datastoreItem xmlns:ds="http://schemas.openxmlformats.org/officeDocument/2006/customXml" ds:itemID="{1259D436-C82E-43E0-8A01-53DF9CED6032}">
   <ds:schemaRefs>
-    <ds:schemaRef ds:uri="http://schemas.microsoft.com/office/2006/metadata/properties"/>
-    <ds:schemaRef ds:uri="http://schemas.microsoft.com/office/infopath/2007/PartnerControls"/>
-    <ds:schemaRef ds:uri="71af3243-3dd4-4a8d-8c0d-dd76da1f02a5"/>
+    <ds:schemaRef ds:uri="http://schemas.microsoft.com/sharepoint/v3/contenttype/forms"/>
   </ds:schemaRefs>
 </ds:datastoreItem>
 </file>
@@ -6695,9 +7564,11 @@
 </file>
 
 <file path=customXml/itemProps3.xml><?xml version="1.0" encoding="utf-8"?>
-<ds:datastoreItem xmlns:ds="http://schemas.openxmlformats.org/officeDocument/2006/customXml" ds:itemID="{1259D436-C82E-43E0-8A01-53DF9CED6032}">
+<ds:datastoreItem xmlns:ds="http://schemas.openxmlformats.org/officeDocument/2006/customXml" ds:itemID="{946BCBFB-BBC7-42F1-95CD-058E172363A0}">
   <ds:schemaRefs>
-    <ds:schemaRef ds:uri="http://schemas.microsoft.com/sharepoint/v3/contenttype/forms"/>
+    <ds:schemaRef ds:uri="http://schemas.microsoft.com/office/2006/metadata/properties"/>
+    <ds:schemaRef ds:uri="http://schemas.microsoft.com/office/infopath/2007/PartnerControls"/>
+    <ds:schemaRef ds:uri="71af3243-3dd4-4a8d-8c0d-dd76da1f02a5"/>
   </ds:schemaRefs>
 </ds:datastoreItem>
 </file>
</xml_diff>

<commit_message>
updated cosine similarity calculation
</commit_message>
<xml_diff>
--- a/docs/Text Similarity.pptx
+++ b/docs/Text Similarity.pptx
@@ -207,7 +207,7 @@
           <a:p>
             <a:fld id="{CC6DBDFE-DD3D-4291-A404-1B97A83A6EA8}" type="datetimeFigureOut">
               <a:rPr lang="en-US" smtClean="0"/>
-              <a:t>2/28/2022</a:t>
+              <a:t>3/3/2022</a:t>
             </a:fld>
             <a:endParaRPr lang="en-US" dirty="0"/>
           </a:p>
@@ -1087,7 +1087,7 @@
           <a:p>
             <a:fld id="{EA0C0817-A112-4847-8014-A94B7D2A4EA3}" type="datetime1">
               <a:rPr lang="en-US" smtClean="0"/>
-              <a:t>2/28/2022</a:t>
+              <a:t>3/3/2022</a:t>
             </a:fld>
             <a:endParaRPr lang="en-US" dirty="0"/>
           </a:p>
@@ -1289,7 +1289,7 @@
           <a:p>
             <a:fld id="{7332B432-ACDA-4023-A761-2BAB76577B62}" type="datetime1">
               <a:rPr lang="en-US" smtClean="0"/>
-              <a:t>2/28/2022</a:t>
+              <a:t>3/3/2022</a:t>
             </a:fld>
             <a:endParaRPr lang="en-US" dirty="0"/>
           </a:p>
@@ -1888,7 +1888,7 @@
           <a:p>
             <a:fld id="{D9C646AA-F36E-4540-911D-FFFC0A0EF24A}" type="datetime1">
               <a:rPr lang="en-US" smtClean="0"/>
-              <a:t>2/28/2022</a:t>
+              <a:t>3/3/2022</a:t>
             </a:fld>
             <a:endParaRPr lang="en-US" dirty="0"/>
           </a:p>
@@ -2208,7 +2208,7 @@
           <a:p>
             <a:fld id="{69186D26-FA5F-4637-B602-B7C2DC34CFD4}" type="datetime1">
               <a:rPr lang="en-US" smtClean="0"/>
-              <a:t>2/28/2022</a:t>
+              <a:t>3/3/2022</a:t>
             </a:fld>
             <a:endParaRPr lang="en-US" dirty="0"/>
           </a:p>
@@ -2645,7 +2645,7 @@
           <a:p>
             <a:fld id="{8A7F15D8-96D1-4781-BC50-CA8A088B2FE4}" type="datetime1">
               <a:rPr lang="en-US" smtClean="0"/>
-              <a:t>2/28/2022</a:t>
+              <a:t>3/3/2022</a:t>
             </a:fld>
             <a:endParaRPr lang="en-US" dirty="0"/>
           </a:p>
@@ -2763,7 +2763,7 @@
           <a:p>
             <a:fld id="{F9A96C99-B8F8-4528-BD05-0E16E943DC09}" type="datetime1">
               <a:rPr lang="en-US" smtClean="0"/>
-              <a:t>2/28/2022</a:t>
+              <a:t>3/3/2022</a:t>
             </a:fld>
             <a:endParaRPr lang="en-US" dirty="0"/>
           </a:p>
@@ -2858,7 +2858,7 @@
           <a:p>
             <a:fld id="{03636942-C211-4B28-8DBD-C953E00AF71B}" type="datetime1">
               <a:rPr lang="en-US" smtClean="0"/>
-              <a:t>2/28/2022</a:t>
+              <a:t>3/3/2022</a:t>
             </a:fld>
             <a:endParaRPr lang="en-US" dirty="0"/>
           </a:p>
@@ -3275,7 +3275,7 @@
           <a:p>
             <a:fld id="{7E8D12A6-918A-48BD-8CB9-CA713993B0EA}" type="datetime1">
               <a:rPr lang="en-US" smtClean="0"/>
-              <a:t>2/28/2022</a:t>
+              <a:t>3/3/2022</a:t>
             </a:fld>
             <a:endParaRPr lang="en-US" dirty="0"/>
           </a:p>
@@ -3537,7 +3537,7 @@
             <a:fld id="{E778CE86-875F-4587-BCF6-FA054AFC0D53}" type="datetime1">
               <a:rPr lang="en-US" smtClean="0"/>
               <a:pPr/>
-              <a:t>2/28/2022</a:t>
+              <a:t>3/3/2022</a:t>
             </a:fld>
             <a:endParaRPr lang="en-US" dirty="0"/>
           </a:p>
@@ -4053,7 +4053,7 @@
           <a:p>
             <a:fld id="{F6FA2B21-3FCD-4721-B95C-427943F61125}" type="datetime1">
               <a:rPr lang="en-US" smtClean="0"/>
-              <a:t>2/28/2022</a:t>
+              <a:t>3/3/2022</a:t>
             </a:fld>
             <a:endParaRPr lang="en-US" dirty="0"/>
           </a:p>
@@ -7298,12 +7298,12 @@
 </file>
 
 <file path=customXml/item1.xml><?xml version="1.0" encoding="utf-8"?>
-<?mso-contentType ?>
-<FormTemplates xmlns="http://schemas.microsoft.com/sharepoint/v3/contenttype/forms">
-  <Display>DocumentLibraryForm</Display>
-  <Edit>DocumentLibraryForm</Edit>
-  <New>DocumentLibraryForm</New>
-</FormTemplates>
+<p:properties xmlns:p="http://schemas.microsoft.com/office/2006/metadata/properties" xmlns:xsi="http://www.w3.org/2001/XMLSchema-instance" xmlns:pc="http://schemas.microsoft.com/office/infopath/2007/PartnerControls">
+  <documentManagement>
+    <Status xmlns="71af3243-3dd4-4a8d-8c0d-dd76da1f02a5">Not started</Status>
+    <MediaServiceKeyPoints xmlns="71af3243-3dd4-4a8d-8c0d-dd76da1f02a5" xsi:nil="true"/>
+  </documentManagement>
+</p:properties>
 </file>
 
 <file path=customXml/item2.xml><?xml version="1.0" encoding="utf-8"?>
@@ -7528,18 +7528,20 @@
 </file>
 
 <file path=customXml/item3.xml><?xml version="1.0" encoding="utf-8"?>
-<p:properties xmlns:p="http://schemas.microsoft.com/office/2006/metadata/properties" xmlns:xsi="http://www.w3.org/2001/XMLSchema-instance" xmlns:pc="http://schemas.microsoft.com/office/infopath/2007/PartnerControls">
-  <documentManagement>
-    <Status xmlns="71af3243-3dd4-4a8d-8c0d-dd76da1f02a5">Not started</Status>
-    <MediaServiceKeyPoints xmlns="71af3243-3dd4-4a8d-8c0d-dd76da1f02a5" xsi:nil="true"/>
-  </documentManagement>
-</p:properties>
+<?mso-contentType ?>
+<FormTemplates xmlns="http://schemas.microsoft.com/sharepoint/v3/contenttype/forms">
+  <Display>DocumentLibraryForm</Display>
+  <Edit>DocumentLibraryForm</Edit>
+  <New>DocumentLibraryForm</New>
+</FormTemplates>
 </file>
 
 <file path=customXml/itemProps1.xml><?xml version="1.0" encoding="utf-8"?>
-<ds:datastoreItem xmlns:ds="http://schemas.openxmlformats.org/officeDocument/2006/customXml" ds:itemID="{1259D436-C82E-43E0-8A01-53DF9CED6032}">
+<ds:datastoreItem xmlns:ds="http://schemas.openxmlformats.org/officeDocument/2006/customXml" ds:itemID="{946BCBFB-BBC7-42F1-95CD-058E172363A0}">
   <ds:schemaRefs>
-    <ds:schemaRef ds:uri="http://schemas.microsoft.com/sharepoint/v3/contenttype/forms"/>
+    <ds:schemaRef ds:uri="http://schemas.microsoft.com/office/2006/metadata/properties"/>
+    <ds:schemaRef ds:uri="http://schemas.microsoft.com/office/infopath/2007/PartnerControls"/>
+    <ds:schemaRef ds:uri="71af3243-3dd4-4a8d-8c0d-dd76da1f02a5"/>
   </ds:schemaRefs>
 </ds:datastoreItem>
 </file>
@@ -7564,11 +7566,9 @@
 </file>
 
 <file path=customXml/itemProps3.xml><?xml version="1.0" encoding="utf-8"?>
-<ds:datastoreItem xmlns:ds="http://schemas.openxmlformats.org/officeDocument/2006/customXml" ds:itemID="{946BCBFB-BBC7-42F1-95CD-058E172363A0}">
+<ds:datastoreItem xmlns:ds="http://schemas.openxmlformats.org/officeDocument/2006/customXml" ds:itemID="{1259D436-C82E-43E0-8A01-53DF9CED6032}">
   <ds:schemaRefs>
-    <ds:schemaRef ds:uri="http://schemas.microsoft.com/office/2006/metadata/properties"/>
-    <ds:schemaRef ds:uri="http://schemas.microsoft.com/office/infopath/2007/PartnerControls"/>
-    <ds:schemaRef ds:uri="71af3243-3dd4-4a8d-8c0d-dd76da1f02a5"/>
+    <ds:schemaRef ds:uri="http://schemas.microsoft.com/sharepoint/v3/contenttype/forms"/>
   </ds:schemaRefs>
 </ds:datastoreItem>
 </file>
</xml_diff>

<commit_message>
modified comparison corpus and rankers
</commit_message>
<xml_diff>
--- a/docs/Text Similarity.pptx
+++ b/docs/Text Similarity.pptx
@@ -5464,6 +5464,15 @@
           <a:p>
             <a:r>
               <a:rPr lang="en-US" dirty="0"/>
+              <a:t>Large natural language models with contextual, semantic word embeddings allow for text comparison</a:t>
+            </a:r>
+          </a:p>
+          <a:p>
+            <a:endParaRPr lang="en-US" dirty="0"/>
+          </a:p>
+          <a:p>
+            <a:r>
+              <a:rPr lang="en-US" dirty="0"/>
               <a:t>Text similarity ranking</a:t>
             </a:r>
           </a:p>
@@ -5483,18 +5492,6 @@
           </a:p>
           <a:p>
             <a:pPr marL="274320" lvl="1" indent="0">
-              <a:buNone/>
-            </a:pPr>
-            <a:endParaRPr lang="en-US" dirty="0"/>
-          </a:p>
-          <a:p>
-            <a:r>
-              <a:rPr lang="en-US" dirty="0"/>
-              <a:t>Large natural language models with contextual, semantic word embeddings allow for text comparison</a:t>
-            </a:r>
-          </a:p>
-          <a:p>
-            <a:pPr marL="0" indent="0">
               <a:buNone/>
             </a:pPr>
             <a:endParaRPr lang="en-US" dirty="0"/>
@@ -7298,12 +7295,12 @@
 </file>
 
 <file path=customXml/item1.xml><?xml version="1.0" encoding="utf-8"?>
-<p:properties xmlns:p="http://schemas.microsoft.com/office/2006/metadata/properties" xmlns:xsi="http://www.w3.org/2001/XMLSchema-instance" xmlns:pc="http://schemas.microsoft.com/office/infopath/2007/PartnerControls">
-  <documentManagement>
-    <Status xmlns="71af3243-3dd4-4a8d-8c0d-dd76da1f02a5">Not started</Status>
-    <MediaServiceKeyPoints xmlns="71af3243-3dd4-4a8d-8c0d-dd76da1f02a5" xsi:nil="true"/>
-  </documentManagement>
-</p:properties>
+<?mso-contentType ?>
+<FormTemplates xmlns="http://schemas.microsoft.com/sharepoint/v3/contenttype/forms">
+  <Display>DocumentLibraryForm</Display>
+  <Edit>DocumentLibraryForm</Edit>
+  <New>DocumentLibraryForm</New>
+</FormTemplates>
 </file>
 
 <file path=customXml/item2.xml><?xml version="1.0" encoding="utf-8"?>
@@ -7528,20 +7525,18 @@
 </file>
 
 <file path=customXml/item3.xml><?xml version="1.0" encoding="utf-8"?>
-<?mso-contentType ?>
-<FormTemplates xmlns="http://schemas.microsoft.com/sharepoint/v3/contenttype/forms">
-  <Display>DocumentLibraryForm</Display>
-  <Edit>DocumentLibraryForm</Edit>
-  <New>DocumentLibraryForm</New>
-</FormTemplates>
+<p:properties xmlns:p="http://schemas.microsoft.com/office/2006/metadata/properties" xmlns:xsi="http://www.w3.org/2001/XMLSchema-instance" xmlns:pc="http://schemas.microsoft.com/office/infopath/2007/PartnerControls">
+  <documentManagement>
+    <Status xmlns="71af3243-3dd4-4a8d-8c0d-dd76da1f02a5">Not started</Status>
+    <MediaServiceKeyPoints xmlns="71af3243-3dd4-4a8d-8c0d-dd76da1f02a5" xsi:nil="true"/>
+  </documentManagement>
+</p:properties>
 </file>
 
 <file path=customXml/itemProps1.xml><?xml version="1.0" encoding="utf-8"?>
-<ds:datastoreItem xmlns:ds="http://schemas.openxmlformats.org/officeDocument/2006/customXml" ds:itemID="{946BCBFB-BBC7-42F1-95CD-058E172363A0}">
+<ds:datastoreItem xmlns:ds="http://schemas.openxmlformats.org/officeDocument/2006/customXml" ds:itemID="{1259D436-C82E-43E0-8A01-53DF9CED6032}">
   <ds:schemaRefs>
-    <ds:schemaRef ds:uri="http://schemas.microsoft.com/office/2006/metadata/properties"/>
-    <ds:schemaRef ds:uri="http://schemas.microsoft.com/office/infopath/2007/PartnerControls"/>
-    <ds:schemaRef ds:uri="71af3243-3dd4-4a8d-8c0d-dd76da1f02a5"/>
+    <ds:schemaRef ds:uri="http://schemas.microsoft.com/sharepoint/v3/contenttype/forms"/>
   </ds:schemaRefs>
 </ds:datastoreItem>
 </file>
@@ -7566,9 +7561,11 @@
 </file>
 
 <file path=customXml/itemProps3.xml><?xml version="1.0" encoding="utf-8"?>
-<ds:datastoreItem xmlns:ds="http://schemas.openxmlformats.org/officeDocument/2006/customXml" ds:itemID="{1259D436-C82E-43E0-8A01-53DF9CED6032}">
+<ds:datastoreItem xmlns:ds="http://schemas.openxmlformats.org/officeDocument/2006/customXml" ds:itemID="{946BCBFB-BBC7-42F1-95CD-058E172363A0}">
   <ds:schemaRefs>
-    <ds:schemaRef ds:uri="http://schemas.microsoft.com/sharepoint/v3/contenttype/forms"/>
+    <ds:schemaRef ds:uri="http://schemas.microsoft.com/office/2006/metadata/properties"/>
+    <ds:schemaRef ds:uri="http://schemas.microsoft.com/office/infopath/2007/PartnerControls"/>
+    <ds:schemaRef ds:uri="71af3243-3dd4-4a8d-8c0d-dd76da1f02a5"/>
   </ds:schemaRefs>
 </ds:datastoreItem>
 </file>
</xml_diff>

<commit_message>
Added checks for flake8 and made flake8 corrections. Updated examples and added an example to the readme. Completed PPT.
</commit_message>
<xml_diff>
--- a/docs/Text Similarity.pptx
+++ b/docs/Text Similarity.pptx
@@ -6477,10 +6477,10 @@
       </p:sp>
       <p:pic>
         <p:nvPicPr>
-          <p:cNvPr id="25" name="Picture 24">
+          <p:cNvPr id="5" name="Picture 4">
             <a:extLst>
               <a:ext uri="{FF2B5EF4-FFF2-40B4-BE49-F238E27FC236}">
-                <a16:creationId xmlns:a16="http://schemas.microsoft.com/office/drawing/2014/main" id="{CC060585-D60A-4DB3-AF0E-65892056B21E}"/>
+                <a16:creationId xmlns:a16="http://schemas.microsoft.com/office/drawing/2014/main" id="{68A45A6F-A380-4D0D-9369-A4BFAE898755}"/>
               </a:ext>
             </a:extLst>
           </p:cNvPr>
@@ -6489,15 +6489,16 @@
           </p:cNvPicPr>
           <p:nvPr/>
         </p:nvPicPr>
-        <p:blipFill rotWithShape="1">
+        <p:blipFill>
           <a:blip r:embed="rId2"/>
-          <a:srcRect r="3778"/>
-          <a:stretch/>
+          <a:stretch>
+            <a:fillRect/>
+          </a:stretch>
         </p:blipFill>
         <p:spPr>
           <a:xfrm>
-            <a:off x="6391923" y="2443507"/>
-            <a:ext cx="5471604" cy="2400300"/>
+            <a:off x="6382539" y="2284391"/>
+            <a:ext cx="5464120" cy="2718798"/>
           </a:xfrm>
           <a:prstGeom prst="rect">
             <a:avLst/>
@@ -7295,12 +7296,12 @@
 </file>
 
 <file path=customXml/item1.xml><?xml version="1.0" encoding="utf-8"?>
-<?mso-contentType ?>
-<FormTemplates xmlns="http://schemas.microsoft.com/sharepoint/v3/contenttype/forms">
-  <Display>DocumentLibraryForm</Display>
-  <Edit>DocumentLibraryForm</Edit>
-  <New>DocumentLibraryForm</New>
-</FormTemplates>
+<p:properties xmlns:p="http://schemas.microsoft.com/office/2006/metadata/properties" xmlns:xsi="http://www.w3.org/2001/XMLSchema-instance" xmlns:pc="http://schemas.microsoft.com/office/infopath/2007/PartnerControls">
+  <documentManagement>
+    <Status xmlns="71af3243-3dd4-4a8d-8c0d-dd76da1f02a5">Not started</Status>
+    <MediaServiceKeyPoints xmlns="71af3243-3dd4-4a8d-8c0d-dd76da1f02a5" xsi:nil="true"/>
+  </documentManagement>
+</p:properties>
 </file>
 
 <file path=customXml/item2.xml><?xml version="1.0" encoding="utf-8"?>
@@ -7525,18 +7526,20 @@
 </file>
 
 <file path=customXml/item3.xml><?xml version="1.0" encoding="utf-8"?>
-<p:properties xmlns:p="http://schemas.microsoft.com/office/2006/metadata/properties" xmlns:xsi="http://www.w3.org/2001/XMLSchema-instance" xmlns:pc="http://schemas.microsoft.com/office/infopath/2007/PartnerControls">
-  <documentManagement>
-    <Status xmlns="71af3243-3dd4-4a8d-8c0d-dd76da1f02a5">Not started</Status>
-    <MediaServiceKeyPoints xmlns="71af3243-3dd4-4a8d-8c0d-dd76da1f02a5" xsi:nil="true"/>
-  </documentManagement>
-</p:properties>
+<?mso-contentType ?>
+<FormTemplates xmlns="http://schemas.microsoft.com/sharepoint/v3/contenttype/forms">
+  <Display>DocumentLibraryForm</Display>
+  <Edit>DocumentLibraryForm</Edit>
+  <New>DocumentLibraryForm</New>
+</FormTemplates>
 </file>
 
 <file path=customXml/itemProps1.xml><?xml version="1.0" encoding="utf-8"?>
-<ds:datastoreItem xmlns:ds="http://schemas.openxmlformats.org/officeDocument/2006/customXml" ds:itemID="{1259D436-C82E-43E0-8A01-53DF9CED6032}">
+<ds:datastoreItem xmlns:ds="http://schemas.openxmlformats.org/officeDocument/2006/customXml" ds:itemID="{946BCBFB-BBC7-42F1-95CD-058E172363A0}">
   <ds:schemaRefs>
-    <ds:schemaRef ds:uri="http://schemas.microsoft.com/sharepoint/v3/contenttype/forms"/>
+    <ds:schemaRef ds:uri="http://schemas.microsoft.com/office/2006/metadata/properties"/>
+    <ds:schemaRef ds:uri="http://schemas.microsoft.com/office/infopath/2007/PartnerControls"/>
+    <ds:schemaRef ds:uri="71af3243-3dd4-4a8d-8c0d-dd76da1f02a5"/>
   </ds:schemaRefs>
 </ds:datastoreItem>
 </file>
@@ -7561,11 +7564,9 @@
 </file>
 
 <file path=customXml/itemProps3.xml><?xml version="1.0" encoding="utf-8"?>
-<ds:datastoreItem xmlns:ds="http://schemas.openxmlformats.org/officeDocument/2006/customXml" ds:itemID="{946BCBFB-BBC7-42F1-95CD-058E172363A0}">
+<ds:datastoreItem xmlns:ds="http://schemas.openxmlformats.org/officeDocument/2006/customXml" ds:itemID="{1259D436-C82E-43E0-8A01-53DF9CED6032}">
   <ds:schemaRefs>
-    <ds:schemaRef ds:uri="http://schemas.microsoft.com/office/2006/metadata/properties"/>
-    <ds:schemaRef ds:uri="http://schemas.microsoft.com/office/infopath/2007/PartnerControls"/>
-    <ds:schemaRef ds:uri="71af3243-3dd4-4a8d-8c0d-dd76da1f02a5"/>
+    <ds:schemaRef ds:uri="http://schemas.microsoft.com/sharepoint/v3/contenttype/forms"/>
   </ds:schemaRefs>
 </ds:datastoreItem>
 </file>
</xml_diff>